<commit_message>
update pratical modeling file
update pratical modeling file
</commit_message>
<xml_diff>
--- a/Practical modeling.pptx
+++ b/Practical modeling.pptx
@@ -21,7 +21,7 @@
     <p:sldId id="267" r:id="rId12"/>
     <p:sldId id="268" r:id="rId13"/>
     <p:sldId id="269" r:id="rId14"/>
-    <p:sldId id="270" r:id="rId15"/>
+    <p:sldId id="278" r:id="rId15"/>
     <p:sldId id="272" r:id="rId16"/>
     <p:sldId id="274" r:id="rId17"/>
     <p:sldId id="277" r:id="rId18"/>
@@ -214,7 +214,7 @@
           <a:p>
             <a:fld id="{906DD170-F70D-4921-9E36-7294D95829A6}" type="datetimeFigureOut">
               <a:rPr lang="fr-FR" smtClean="0"/>
-              <a:t>23/03/2024</a:t>
+              <a:t>29/03/2024</a:t>
             </a:fld>
             <a:endParaRPr lang="fr-FR"/>
           </a:p>
@@ -712,7 +712,7 @@
           <a:p>
             <a:fld id="{8CC41EBD-9728-4ADB-BD85-202EBC68D826}" type="datetimeFigureOut">
               <a:rPr lang="fr-FR" smtClean="0"/>
-              <a:t>23/03/2024</a:t>
+              <a:t>29/03/2024</a:t>
             </a:fld>
             <a:endParaRPr lang="fr-FR"/>
           </a:p>
@@ -910,7 +910,7 @@
           <a:p>
             <a:fld id="{8CC41EBD-9728-4ADB-BD85-202EBC68D826}" type="datetimeFigureOut">
               <a:rPr lang="fr-FR" smtClean="0"/>
-              <a:t>23/03/2024</a:t>
+              <a:t>29/03/2024</a:t>
             </a:fld>
             <a:endParaRPr lang="fr-FR"/>
           </a:p>
@@ -1118,7 +1118,7 @@
           <a:p>
             <a:fld id="{8CC41EBD-9728-4ADB-BD85-202EBC68D826}" type="datetimeFigureOut">
               <a:rPr lang="fr-FR" smtClean="0"/>
-              <a:t>23/03/2024</a:t>
+              <a:t>29/03/2024</a:t>
             </a:fld>
             <a:endParaRPr lang="fr-FR"/>
           </a:p>
@@ -1316,7 +1316,7 @@
           <a:p>
             <a:fld id="{8CC41EBD-9728-4ADB-BD85-202EBC68D826}" type="datetimeFigureOut">
               <a:rPr lang="fr-FR" smtClean="0"/>
-              <a:t>23/03/2024</a:t>
+              <a:t>29/03/2024</a:t>
             </a:fld>
             <a:endParaRPr lang="fr-FR"/>
           </a:p>
@@ -1591,7 +1591,7 @@
           <a:p>
             <a:fld id="{8CC41EBD-9728-4ADB-BD85-202EBC68D826}" type="datetimeFigureOut">
               <a:rPr lang="fr-FR" smtClean="0"/>
-              <a:t>23/03/2024</a:t>
+              <a:t>29/03/2024</a:t>
             </a:fld>
             <a:endParaRPr lang="fr-FR"/>
           </a:p>
@@ -1856,7 +1856,7 @@
           <a:p>
             <a:fld id="{8CC41EBD-9728-4ADB-BD85-202EBC68D826}" type="datetimeFigureOut">
               <a:rPr lang="fr-FR" smtClean="0"/>
-              <a:t>23/03/2024</a:t>
+              <a:t>29/03/2024</a:t>
             </a:fld>
             <a:endParaRPr lang="fr-FR"/>
           </a:p>
@@ -2268,7 +2268,7 @@
           <a:p>
             <a:fld id="{8CC41EBD-9728-4ADB-BD85-202EBC68D826}" type="datetimeFigureOut">
               <a:rPr lang="fr-FR" smtClean="0"/>
-              <a:t>23/03/2024</a:t>
+              <a:t>29/03/2024</a:t>
             </a:fld>
             <a:endParaRPr lang="fr-FR"/>
           </a:p>
@@ -2409,7 +2409,7 @@
           <a:p>
             <a:fld id="{8CC41EBD-9728-4ADB-BD85-202EBC68D826}" type="datetimeFigureOut">
               <a:rPr lang="fr-FR" smtClean="0"/>
-              <a:t>23/03/2024</a:t>
+              <a:t>29/03/2024</a:t>
             </a:fld>
             <a:endParaRPr lang="fr-FR"/>
           </a:p>
@@ -2522,7 +2522,7 @@
           <a:p>
             <a:fld id="{8CC41EBD-9728-4ADB-BD85-202EBC68D826}" type="datetimeFigureOut">
               <a:rPr lang="fr-FR" smtClean="0"/>
-              <a:t>23/03/2024</a:t>
+              <a:t>29/03/2024</a:t>
             </a:fld>
             <a:endParaRPr lang="fr-FR"/>
           </a:p>
@@ -2833,7 +2833,7 @@
           <a:p>
             <a:fld id="{8CC41EBD-9728-4ADB-BD85-202EBC68D826}" type="datetimeFigureOut">
               <a:rPr lang="fr-FR" smtClean="0"/>
-              <a:t>23/03/2024</a:t>
+              <a:t>29/03/2024</a:t>
             </a:fld>
             <a:endParaRPr lang="fr-FR"/>
           </a:p>
@@ -3121,7 +3121,7 @@
           <a:p>
             <a:fld id="{8CC41EBD-9728-4ADB-BD85-202EBC68D826}" type="datetimeFigureOut">
               <a:rPr lang="fr-FR" smtClean="0"/>
-              <a:t>23/03/2024</a:t>
+              <a:t>29/03/2024</a:t>
             </a:fld>
             <a:endParaRPr lang="fr-FR"/>
           </a:p>
@@ -3362,7 +3362,7 @@
           <a:p>
             <a:fld id="{8CC41EBD-9728-4ADB-BD85-202EBC68D826}" type="datetimeFigureOut">
               <a:rPr lang="fr-FR" smtClean="0"/>
-              <a:t>23/03/2024</a:t>
+              <a:t>29/03/2024</a:t>
             </a:fld>
             <a:endParaRPr lang="fr-FR"/>
           </a:p>
@@ -7409,8 +7409,8 @@
         </p:nvGrpSpPr>
         <p:grpSpPr>
           <a:xfrm>
-            <a:off x="540644" y="1366306"/>
-            <a:ext cx="3955942" cy="4544300"/>
+            <a:off x="4697555" y="1036431"/>
+            <a:ext cx="3789575" cy="4126069"/>
             <a:chOff x="6905580" y="1196624"/>
             <a:chExt cx="4206605" cy="4748430"/>
           </a:xfrm>
@@ -7509,12 +7509,42 @@
           </p:txBody>
         </p:sp>
       </p:grpSp>
+      <p:pic>
+        <p:nvPicPr>
+          <p:cNvPr id="2" name="Image 1">
+            <a:extLst>
+              <a:ext uri="{FF2B5EF4-FFF2-40B4-BE49-F238E27FC236}">
+                <a16:creationId xmlns:a16="http://schemas.microsoft.com/office/drawing/2014/main" id="{B49F6A85-5920-38ED-6744-A4D13FCEFA3A}"/>
+              </a:ext>
+            </a:extLst>
+          </p:cNvPr>
+          <p:cNvPicPr>
+            <a:picLocks noChangeAspect="1"/>
+          </p:cNvPicPr>
+          <p:nvPr/>
+        </p:nvPicPr>
+        <p:blipFill>
+          <a:blip r:embed="rId3"/>
+          <a:stretch>
+            <a:fillRect/>
+          </a:stretch>
+        </p:blipFill>
+        <p:spPr>
+          <a:xfrm>
+            <a:off x="275104" y="1385221"/>
+            <a:ext cx="3955942" cy="4400251"/>
+          </a:xfrm>
+          <a:prstGeom prst="rect">
+            <a:avLst/>
+          </a:prstGeom>
+        </p:spPr>
+      </p:pic>
       <p:sp>
         <p:nvSpPr>
-          <p:cNvPr id="13" name="ZoneTexte 12">
+          <p:cNvPr id="4" name="ZoneTexte 3">
             <a:extLst>
               <a:ext uri="{FF2B5EF4-FFF2-40B4-BE49-F238E27FC236}">
-                <a16:creationId xmlns:a16="http://schemas.microsoft.com/office/drawing/2014/main" id="{1F24AC8E-0349-2802-2F19-8F8DCBD7AE67}"/>
+                <a16:creationId xmlns:a16="http://schemas.microsoft.com/office/drawing/2014/main" id="{C392D579-D4EC-7797-E423-F4142CAD1D7B}"/>
               </a:ext>
             </a:extLst>
           </p:cNvPr>
@@ -7523,8 +7553,8 @@
         </p:nvSpPr>
         <p:spPr>
           <a:xfrm>
-            <a:off x="5314742" y="1591845"/>
-            <a:ext cx="6094428" cy="3372077"/>
+            <a:off x="8487130" y="1561512"/>
+            <a:ext cx="3588607" cy="4577985"/>
           </a:xfrm>
           <a:prstGeom prst="rect">
             <a:avLst/>
@@ -7545,21 +7575,21 @@
               <a:buChar char="•"/>
             </a:pPr>
             <a:r>
-              <a:rPr lang="en-US" sz="1600" dirty="0">
+              <a:rPr lang="en-US" sz="1400" dirty="0">
                 <a:latin typeface="Times New Roman" panose="02020603050405020304" pitchFamily="18" charset="0"/>
                 <a:cs typeface="Times New Roman" panose="02020603050405020304" pitchFamily="18" charset="0"/>
               </a:rPr>
               <a:t>This plot of local model quality, shows the energy of each amino acid residue in the protein chain is plotted along the x-axis according to its position (</a:t>
             </a:r>
             <a:r>
-              <a:rPr lang="en-US" sz="1600" dirty="0" err="1">
+              <a:rPr lang="en-US" sz="1400" dirty="0" err="1">
                 <a:latin typeface="Times New Roman" panose="02020603050405020304" pitchFamily="18" charset="0"/>
                 <a:cs typeface="Times New Roman" panose="02020603050405020304" pitchFamily="18" charset="0"/>
               </a:rPr>
               <a:t>i</a:t>
             </a:r>
             <a:r>
-              <a:rPr lang="en-US" sz="1600" dirty="0">
+              <a:rPr lang="en-US" sz="1400" dirty="0">
                 <a:latin typeface="Times New Roman" panose="02020603050405020304" pitchFamily="18" charset="0"/>
                 <a:cs typeface="Times New Roman" panose="02020603050405020304" pitchFamily="18" charset="0"/>
               </a:rPr>
@@ -7575,7 +7605,7 @@
               <a:buChar char="•"/>
             </a:pPr>
             <a:r>
-              <a:rPr lang="en-US" sz="1600" dirty="0">
+              <a:rPr lang="en-US" sz="1400" dirty="0">
                 <a:latin typeface="Times New Roman" panose="02020603050405020304" pitchFamily="18" charset="0"/>
                 <a:cs typeface="Times New Roman" panose="02020603050405020304" pitchFamily="18" charset="0"/>
               </a:rPr>
@@ -7591,7 +7621,7 @@
               <a:buChar char="•"/>
             </a:pPr>
             <a:r>
-              <a:rPr lang="en-US" sz="1600" dirty="0">
+              <a:rPr lang="en-US" sz="1400" dirty="0">
                 <a:latin typeface="Times New Roman" panose="02020603050405020304" pitchFamily="18" charset="0"/>
                 <a:cs typeface="Times New Roman" panose="02020603050405020304" pitchFamily="18" charset="0"/>
               </a:rPr>
@@ -7607,16 +7637,95 @@
               <a:buChar char="•"/>
             </a:pPr>
             <a:r>
-              <a:rPr lang="en-US" sz="1600" b="0" i="0" dirty="0">
+              <a:rPr lang="en-US" sz="1400" b="0" i="0" dirty="0">
                 <a:effectLst/>
                 <a:latin typeface="Times New Roman" panose="02020603050405020304" pitchFamily="18" charset="0"/>
                 <a:cs typeface="Times New Roman" panose="02020603050405020304" pitchFamily="18" charset="0"/>
               </a:rPr>
               <a:t>Window size refers to the number of amino acids that are considered together when calculating the local model quality. The smoother the curve, the better the local model quality is predicted to be.</a:t>
             </a:r>
-            <a:endParaRPr lang="fr-FR" sz="1600" dirty="0">
+            <a:endParaRPr lang="fr-FR" sz="1400" dirty="0">
               <a:latin typeface="Times New Roman" panose="02020603050405020304" pitchFamily="18" charset="0"/>
               <a:cs typeface="Times New Roman" panose="02020603050405020304" pitchFamily="18" charset="0"/>
+            </a:endParaRPr>
+          </a:p>
+        </p:txBody>
+      </p:sp>
+      <p:sp>
+        <p:nvSpPr>
+          <p:cNvPr id="6" name="ZoneTexte 5">
+            <a:extLst>
+              <a:ext uri="{FF2B5EF4-FFF2-40B4-BE49-F238E27FC236}">
+                <a16:creationId xmlns:a16="http://schemas.microsoft.com/office/drawing/2014/main" id="{32788BAA-2F22-F298-3FA5-FCDF8A6C89C6}"/>
+              </a:ext>
+            </a:extLst>
+          </p:cNvPr>
+          <p:cNvSpPr txBox="1"/>
+          <p:nvPr/>
+        </p:nvSpPr>
+        <p:spPr>
+          <a:xfrm>
+            <a:off x="548481" y="5472779"/>
+            <a:ext cx="6542202" cy="1017907"/>
+          </a:xfrm>
+          <a:prstGeom prst="rect">
+            <a:avLst/>
+          </a:prstGeom>
+          <a:noFill/>
+        </p:spPr>
+        <p:txBody>
+          <a:bodyPr wrap="square" rtlCol="0">
+            <a:spAutoFit/>
+          </a:bodyPr>
+          <a:lstStyle/>
+          <a:p>
+            <a:pPr>
+              <a:lnSpc>
+                <a:spcPct val="150000"/>
+              </a:lnSpc>
+            </a:pPr>
+            <a:r>
+              <a:rPr lang="en-US" sz="1400" dirty="0">
+                <a:latin typeface="Tahoma" panose="020B0604030504040204" pitchFamily="34" charset="0"/>
+                <a:ea typeface="Tahoma" panose="020B0604030504040204" pitchFamily="34" charset="0"/>
+                <a:cs typeface="Tahoma" panose="020B0604030504040204" pitchFamily="34" charset="0"/>
+              </a:rPr>
+              <a:t>The theoretical model's Z-score value is similar </a:t>
+            </a:r>
+          </a:p>
+          <a:p>
+            <a:pPr>
+              <a:lnSpc>
+                <a:spcPct val="150000"/>
+              </a:lnSpc>
+            </a:pPr>
+            <a:r>
+              <a:rPr lang="en-US" sz="1400" dirty="0">
+                <a:latin typeface="Tahoma" panose="020B0604030504040204" pitchFamily="34" charset="0"/>
+                <a:ea typeface="Tahoma" panose="020B0604030504040204" pitchFamily="34" charset="0"/>
+                <a:cs typeface="Tahoma" panose="020B0604030504040204" pitchFamily="34" charset="0"/>
+              </a:rPr>
+              <a:t>to the Z-score of the experimental structure solved </a:t>
+            </a:r>
+          </a:p>
+          <a:p>
+            <a:pPr>
+              <a:lnSpc>
+                <a:spcPct val="150000"/>
+              </a:lnSpc>
+            </a:pPr>
+            <a:r>
+              <a:rPr lang="en-US" sz="1400" dirty="0">
+                <a:latin typeface="Tahoma" panose="020B0604030504040204" pitchFamily="34" charset="0"/>
+                <a:ea typeface="Tahoma" panose="020B0604030504040204" pitchFamily="34" charset="0"/>
+                <a:cs typeface="Tahoma" panose="020B0604030504040204" pitchFamily="34" charset="0"/>
+              </a:rPr>
+              <a:t>by X-rays.</a:t>
+            </a:r>
+            <a:endParaRPr lang="fr-FR" sz="1400" dirty="0">
+              <a:latin typeface="Tahoma" panose="020B0604030504040204" pitchFamily="34" charset="0"/>
+              <a:ea typeface="Tahoma" panose="020B0604030504040204" pitchFamily="34" charset="0"/>
+              <a:cs typeface="Tahoma" panose="020B0604030504040204" pitchFamily="34" charset="0"/>
             </a:endParaRPr>
           </a:p>
         </p:txBody>
@@ -7624,7 +7733,7 @@
     </p:spTree>
     <p:extLst>
       <p:ext uri="{BB962C8B-B14F-4D97-AF65-F5344CB8AC3E}">
-        <p14:creationId xmlns:p14="http://schemas.microsoft.com/office/powerpoint/2010/main" val="2512470493"/>
+        <p14:creationId xmlns:p14="http://schemas.microsoft.com/office/powerpoint/2010/main" val="3525555870"/>
       </p:ext>
     </p:extLst>
   </p:cSld>

</xml_diff>